<commit_message>
code, notes, util updated
</commit_message>
<xml_diff>
--- a/others/eosio_vs_eth.pptx
+++ b/others/eosio_vs_eth.pptx
@@ -5,8 +5,10 @@
     <p:sldMasterId id="2147483648" r:id="rId1"/>
   </p:sldMasterIdLst>
   <p:sldIdLst>
-    <p:sldId id="256" r:id="rId2"/>
-    <p:sldId id="257" r:id="rId3"/>
+    <p:sldId id="259" r:id="rId2"/>
+    <p:sldId id="256" r:id="rId3"/>
+    <p:sldId id="258" r:id="rId4"/>
+    <p:sldId id="257" r:id="rId5"/>
   </p:sldIdLst>
   <p:sldSz cx="12192000" cy="6858000"/>
   <p:notesSz cx="6858000" cy="9144000"/>
@@ -105,6 +107,11 @@
       </a:defRPr>
     </a:lvl9pPr>
   </p:defaultTextStyle>
+  <p:extLst>
+    <p:ext uri="{EFAFB233-063F-42B5-8137-9DF3F51BA10A}">
+      <p15:sldGuideLst xmlns:p15="http://schemas.microsoft.com/office/powerpoint/2012/main"/>
+    </p:ext>
+  </p:extLst>
 </p:presentation>
 </file>
 
@@ -2741,9 +2748,16 @@
 <p:sldMaster xmlns:a="http://schemas.openxmlformats.org/drawingml/2006/main" xmlns:r="http://schemas.openxmlformats.org/officeDocument/2006/relationships" xmlns:p="http://schemas.openxmlformats.org/presentationml/2006/main">
   <p:cSld>
     <p:bg>
-      <p:bgRef idx="1001">
-        <a:schemeClr val="bg1"/>
-      </p:bgRef>
+      <p:bgPr>
+        <a:blipFill dpi="0" rotWithShape="1">
+          <a:blip r:embed="rId13">
+            <a:alphaModFix amt="56000"/>
+          </a:blip>
+          <a:srcRect/>
+          <a:tile tx="0" ty="0" sx="100000" sy="100000" flip="none" algn="tl"/>
+        </a:blipFill>
+        <a:effectLst/>
+      </p:bgPr>
     </p:bg>
     <p:spTree>
       <p:nvGrpSpPr>
@@ -3308,18 +3322,6 @@
 <file path=ppt/slides/slide1.xml><?xml version="1.0" encoding="utf-8"?>
 <p:sld xmlns:a="http://schemas.openxmlformats.org/drawingml/2006/main" xmlns:r="http://schemas.openxmlformats.org/officeDocument/2006/relationships" xmlns:p="http://schemas.openxmlformats.org/presentationml/2006/main">
   <p:cSld>
-    <p:bg>
-      <p:bgPr>
-        <a:blipFill dpi="0" rotWithShape="1">
-          <a:blip r:embed="rId2">
-            <a:alphaModFix amt="56000"/>
-          </a:blip>
-          <a:srcRect/>
-          <a:tile tx="0" ty="0" sx="100000" sy="100000" flip="none" algn="tl"/>
-        </a:blipFill>
-        <a:effectLst/>
-      </p:bgPr>
-    </p:bg>
     <p:spTree>
       <p:nvGrpSpPr>
         <p:cNvPr id="1" name=""/>
@@ -3336,153 +3338,161 @@
       </p:grpSpPr>
       <p:pic>
         <p:nvPicPr>
-          <p:cNvPr id="10" name="Picture 9">
-            <a:extLst>
-              <a:ext uri="{FF2B5EF4-FFF2-40B4-BE49-F238E27FC236}">
-                <a16:creationId xmlns:a16="http://schemas.microsoft.com/office/drawing/2014/main" id="{58A75465-9806-4B5C-8366-F16A06D2E23E}"/>
+          <p:cNvPr id="5" name="Content Placeholder 4">
+            <a:extLst>
+              <a:ext uri="{FF2B5EF4-FFF2-40B4-BE49-F238E27FC236}">
+                <a16:creationId xmlns:a16="http://schemas.microsoft.com/office/drawing/2014/main" id="{358CACFD-2014-47E0-A148-BD45F4D68914}"/>
               </a:ext>
             </a:extLst>
           </p:cNvPr>
           <p:cNvPicPr>
-            <a:picLocks noChangeAspect="1"/>
+            <a:picLocks noGrp="1" noChangeAspect="1"/>
           </p:cNvPicPr>
-          <p:nvPr/>
+          <p:nvPr>
+            <p:ph idx="1"/>
+          </p:nvPr>
         </p:nvPicPr>
         <p:blipFill>
-          <a:blip r:embed="rId3"/>
+          <a:blip r:embed="rId2">
+            <a:extLst>
+              <a:ext uri="{28A0092B-C50C-407E-A947-70E740481C1C}">
+                <a14:useLocalDpi xmlns:a14="http://schemas.microsoft.com/office/drawing/2010/main" val="0"/>
+              </a:ext>
+            </a:extLst>
+          </a:blip>
           <a:stretch>
             <a:fillRect/>
           </a:stretch>
         </p:blipFill>
         <p:spPr>
           <a:xfrm>
-            <a:off x="7287218" y="1936658"/>
-            <a:ext cx="4652856" cy="2523375"/>
+            <a:off x="427264" y="1302609"/>
+            <a:ext cx="7810500" cy="2952750"/>
           </a:xfrm>
-          <a:prstGeom prst="rect">
-            <a:avLst/>
-          </a:prstGeom>
         </p:spPr>
       </p:pic>
-      <p:pic>
-        <p:nvPicPr>
-          <p:cNvPr id="19" name="Picture 18">
-            <a:extLst>
-              <a:ext uri="{FF2B5EF4-FFF2-40B4-BE49-F238E27FC236}">
-                <a16:creationId xmlns:a16="http://schemas.microsoft.com/office/drawing/2014/main" id="{107210C5-CAC3-40D4-B5FE-48610A712655}"/>
-              </a:ext>
-            </a:extLst>
-          </p:cNvPr>
-          <p:cNvPicPr>
-            <a:picLocks noChangeAspect="1"/>
-          </p:cNvPicPr>
+      <p:sp>
+        <p:nvSpPr>
+          <p:cNvPr id="7" name="Rectangle 6">
+            <a:extLst>
+              <a:ext uri="{FF2B5EF4-FFF2-40B4-BE49-F238E27FC236}">
+                <a16:creationId xmlns:a16="http://schemas.microsoft.com/office/drawing/2014/main" id="{98A20187-F779-491B-A717-C3D61A927DB3}"/>
+              </a:ext>
+            </a:extLst>
+          </p:cNvPr>
+          <p:cNvSpPr/>
           <p:nvPr/>
-        </p:nvPicPr>
-        <p:blipFill>
-          <a:blip r:embed="rId4"/>
-          <a:stretch>
-            <a:fillRect/>
-          </a:stretch>
-        </p:blipFill>
+        </p:nvSpPr>
         <p:spPr>
           <a:xfrm>
-            <a:off x="251926" y="1936658"/>
-            <a:ext cx="6459289" cy="2737321"/>
-          </a:xfrm>
-          <a:prstGeom prst="rect">
-            <a:avLst/>
-          </a:prstGeom>
-        </p:spPr>
-      </p:pic>
-      <p:sp>
-        <p:nvSpPr>
-          <p:cNvPr id="11" name="TextBox 10">
-            <a:extLst>
-              <a:ext uri="{FF2B5EF4-FFF2-40B4-BE49-F238E27FC236}">
-                <a16:creationId xmlns:a16="http://schemas.microsoft.com/office/drawing/2014/main" id="{582E15BF-2DE7-483A-8A38-1E0658A1ED71}"/>
-              </a:ext>
-            </a:extLst>
-          </p:cNvPr>
-          <p:cNvSpPr txBox="1"/>
-          <p:nvPr/>
-        </p:nvSpPr>
-        <p:spPr>
-          <a:xfrm>
-            <a:off x="3071995" y="1936658"/>
-            <a:ext cx="819150" cy="369332"/>
+            <a:off x="8237764" y="1293278"/>
+            <a:ext cx="3677428" cy="2952750"/>
           </a:xfrm>
           <a:prstGeom prst="rect">
             <a:avLst/>
           </a:prstGeom>
           <a:solidFill>
-            <a:srgbClr val="00B050"/>
+            <a:schemeClr val="bg1">
+              <a:lumMod val="95000"/>
+            </a:schemeClr>
           </a:solidFill>
           <a:ln>
-            <a:solidFill>
-              <a:srgbClr val="00B050"/>
-            </a:solidFill>
+            <a:noFill/>
           </a:ln>
-          <a:effectLst>
-            <a:outerShdw blurRad="50800" dist="38100" dir="2700000" algn="tl" rotWithShape="0">
-              <a:prstClr val="black">
-                <a:alpha val="40000"/>
-              </a:prstClr>
-            </a:outerShdw>
-          </a:effectLst>
         </p:spPr>
-        <p:txBody>
-          <a:bodyPr wrap="square" rtlCol="0">
-            <a:spAutoFit/>
-          </a:bodyPr>
+        <p:style>
+          <a:lnRef idx="2">
+            <a:schemeClr val="accent1">
+              <a:shade val="50000"/>
+            </a:schemeClr>
+          </a:lnRef>
+          <a:fillRef idx="1">
+            <a:schemeClr val="accent1"/>
+          </a:fillRef>
+          <a:effectRef idx="0">
+            <a:schemeClr val="accent1"/>
+          </a:effectRef>
+          <a:fontRef idx="minor">
+            <a:schemeClr val="lt1"/>
+          </a:fontRef>
+        </p:style>
+        <p:txBody>
+          <a:bodyPr rtlCol="0" anchor="ctr"/>
           <a:lstStyle/>
           <a:p>
             <a:pPr algn="ctr"/>
-            <a:r>
-              <a:rPr lang="en-US" b="1" dirty="0">
-                <a:solidFill>
-                  <a:schemeClr val="bg1"/>
-                </a:solidFill>
-              </a:rPr>
-              <a:t>EOSIO</a:t>
-            </a:r>
-          </a:p>
-        </p:txBody>
-      </p:sp>
-      <p:sp>
-        <p:nvSpPr>
-          <p:cNvPr id="12" name="TextBox 11">
-            <a:extLst>
-              <a:ext uri="{FF2B5EF4-FFF2-40B4-BE49-F238E27FC236}">
-                <a16:creationId xmlns:a16="http://schemas.microsoft.com/office/drawing/2014/main" id="{5E26C181-E710-4A62-A739-A330C69C3CAA}"/>
-              </a:ext>
-            </a:extLst>
-          </p:cNvPr>
-          <p:cNvSpPr txBox="1"/>
+            <a:endParaRPr lang="en-US"/>
+          </a:p>
+        </p:txBody>
+      </p:sp>
+      <p:pic>
+        <p:nvPicPr>
+          <p:cNvPr id="1028" name="Picture 4" descr="Ethereum brand assets | ethereum.org">
+            <a:extLst>
+              <a:ext uri="{FF2B5EF4-FFF2-40B4-BE49-F238E27FC236}">
+                <a16:creationId xmlns:a16="http://schemas.microsoft.com/office/drawing/2014/main" id="{5B6C1E14-C6D3-4143-A41D-A35097ECDC2A}"/>
+              </a:ext>
+            </a:extLst>
+          </p:cNvPr>
+          <p:cNvPicPr>
+            <a:picLocks noChangeAspect="1" noChangeArrowheads="1"/>
+          </p:cNvPicPr>
           <p:nvPr/>
-        </p:nvSpPr>
-        <p:spPr>
+        </p:nvPicPr>
+        <p:blipFill>
+          <a:blip r:embed="rId3">
+            <a:extLst>
+              <a:ext uri="{28A0092B-C50C-407E-A947-70E740481C1C}">
+                <a14:useLocalDpi xmlns:a14="http://schemas.microsoft.com/office/drawing/2010/main" val="0"/>
+              </a:ext>
+            </a:extLst>
+          </a:blip>
+          <a:srcRect/>
+          <a:stretch>
+            <a:fillRect/>
+          </a:stretch>
+        </p:blipFill>
+        <p:spPr bwMode="auto">
           <a:xfrm>
-            <a:off x="9472804" y="1936658"/>
-            <a:ext cx="819150" cy="369332"/>
+            <a:off x="9252339" y="1720567"/>
+            <a:ext cx="1364732" cy="2116834"/>
           </a:xfrm>
           <a:prstGeom prst="rect">
             <a:avLst/>
           </a:prstGeom>
-          <a:solidFill>
-            <a:srgbClr val="00B0F0"/>
-          </a:solidFill>
-          <a:ln>
-            <a:solidFill>
-              <a:srgbClr val="00B0F0"/>
-            </a:solidFill>
-          </a:ln>
-          <a:effectLst>
-            <a:outerShdw blurRad="50800" dist="38100" dir="2700000" algn="tl" rotWithShape="0">
-              <a:prstClr val="black">
-                <a:alpha val="40000"/>
-              </a:prstClr>
-            </a:outerShdw>
-          </a:effectLst>
+          <a:noFill/>
+          <a:extLst>
+            <a:ext uri="{909E8E84-426E-40DD-AFC4-6F175D3DCCD1}">
+              <a14:hiddenFill xmlns:a14="http://schemas.microsoft.com/office/drawing/2010/main">
+                <a:solidFill>
+                  <a:srgbClr val="FFFFFF"/>
+                </a:solidFill>
+              </a14:hiddenFill>
+            </a:ext>
+          </a:extLst>
+        </p:spPr>
+      </p:pic>
+      <p:sp>
+        <p:nvSpPr>
+          <p:cNvPr id="6" name="TextBox 5">
+            <a:extLst>
+              <a:ext uri="{FF2B5EF4-FFF2-40B4-BE49-F238E27FC236}">
+                <a16:creationId xmlns:a16="http://schemas.microsoft.com/office/drawing/2014/main" id="{2F9E7408-A73B-4362-92D7-8A338D8D26CE}"/>
+              </a:ext>
+            </a:extLst>
+          </p:cNvPr>
+          <p:cNvSpPr txBox="1"/>
+          <p:nvPr/>
+        </p:nvSpPr>
+        <p:spPr>
+          <a:xfrm>
+            <a:off x="6840246" y="1896204"/>
+            <a:ext cx="2379307" cy="1569660"/>
+          </a:xfrm>
+          <a:prstGeom prst="rect">
+            <a:avLst/>
+          </a:prstGeom>
+          <a:noFill/>
         </p:spPr>
         <p:txBody>
           <a:bodyPr wrap="square" rtlCol="0">
@@ -3492,20 +3502,119 @@
           <a:p>
             <a:pPr algn="ctr"/>
             <a:r>
-              <a:rPr lang="en-US" dirty="0">
-                <a:solidFill>
-                  <a:schemeClr val="bg1"/>
-                </a:solidFill>
+              <a:rPr lang="en-US" sz="9600" dirty="0">
+                <a:latin typeface="Adobe Song Std L" panose="02020300000000000000" pitchFamily="18" charset="-128"/>
+                <a:ea typeface="Adobe Song Std L" panose="02020300000000000000" pitchFamily="18" charset="-128"/>
               </a:rPr>
-              <a:t>ETH</a:t>
-            </a:r>
+              <a:t>eth</a:t>
+            </a:r>
+          </a:p>
+        </p:txBody>
+      </p:sp>
+      <p:sp>
+        <p:nvSpPr>
+          <p:cNvPr id="8" name="TextBox 7">
+            <a:extLst>
+              <a:ext uri="{FF2B5EF4-FFF2-40B4-BE49-F238E27FC236}">
+                <a16:creationId xmlns:a16="http://schemas.microsoft.com/office/drawing/2014/main" id="{E3E16D5D-75BE-4455-BA9B-6E4B594CD552}"/>
+              </a:ext>
+            </a:extLst>
+          </p:cNvPr>
+          <p:cNvSpPr txBox="1"/>
+          <p:nvPr/>
+        </p:nvSpPr>
+        <p:spPr>
+          <a:xfrm>
+            <a:off x="6316824" y="2500605"/>
+            <a:ext cx="410547" cy="769441"/>
+          </a:xfrm>
+          <a:prstGeom prst="rect">
+            <a:avLst/>
+          </a:prstGeom>
+          <a:noFill/>
+        </p:spPr>
+        <p:txBody>
+          <a:bodyPr wrap="square" rtlCol="0">
+            <a:spAutoFit/>
+          </a:bodyPr>
+          <a:lstStyle/>
+          <a:p>
+            <a:r>
+              <a:rPr lang="en-US" sz="4400" dirty="0">
+                <a:ln w="0"/>
+                <a:gradFill>
+                  <a:gsLst>
+                    <a:gs pos="21000">
+                      <a:srgbClr val="53575C"/>
+                    </a:gs>
+                    <a:gs pos="88000">
+                      <a:srgbClr val="C5C7CA"/>
+                    </a:gs>
+                  </a:gsLst>
+                  <a:lin ang="5400000"/>
+                </a:gradFill>
+              </a:rPr>
+              <a:t>&amp;</a:t>
+            </a:r>
+          </a:p>
+        </p:txBody>
+      </p:sp>
+      <p:sp>
+        <p:nvSpPr>
+          <p:cNvPr id="9" name="Rectangle 8">
+            <a:extLst>
+              <a:ext uri="{FF2B5EF4-FFF2-40B4-BE49-F238E27FC236}">
+                <a16:creationId xmlns:a16="http://schemas.microsoft.com/office/drawing/2014/main" id="{C483E072-4B03-4F81-9FE5-D51A6D85E524}"/>
+              </a:ext>
+            </a:extLst>
+          </p:cNvPr>
+          <p:cNvSpPr/>
+          <p:nvPr/>
+        </p:nvSpPr>
+        <p:spPr>
+          <a:xfrm>
+            <a:off x="427264" y="1302609"/>
+            <a:ext cx="11487928" cy="2952750"/>
+          </a:xfrm>
+          <a:prstGeom prst="rect">
+            <a:avLst/>
+          </a:prstGeom>
+          <a:noFill/>
+          <a:ln>
+            <a:solidFill>
+              <a:schemeClr val="accent1"/>
+            </a:solidFill>
+          </a:ln>
+        </p:spPr>
+        <p:style>
+          <a:lnRef idx="2">
+            <a:schemeClr val="accent1">
+              <a:shade val="50000"/>
+            </a:schemeClr>
+          </a:lnRef>
+          <a:fillRef idx="1">
+            <a:schemeClr val="accent1"/>
+          </a:fillRef>
+          <a:effectRef idx="0">
+            <a:schemeClr val="accent1"/>
+          </a:effectRef>
+          <a:fontRef idx="minor">
+            <a:schemeClr val="lt1"/>
+          </a:fontRef>
+        </p:style>
+        <p:txBody>
+          <a:bodyPr rtlCol="0" anchor="ctr"/>
+          <a:lstStyle/>
+          <a:p>
+            <a:pPr algn="ctr"/>
+            <a:endParaRPr lang="en-US"/>
           </a:p>
         </p:txBody>
       </p:sp>
     </p:spTree>
     <p:extLst>
       <p:ext uri="{BB962C8B-B14F-4D97-AF65-F5344CB8AC3E}">
-        <p14:creationId xmlns:p14="http://schemas.microsoft.com/office/powerpoint/2010/main" val="2733668004"/>
+        <p14:creationId xmlns:p14="http://schemas.microsoft.com/office/powerpoint/2010/main" val="911378413"/>
       </p:ext>
     </p:extLst>
   </p:cSld>
@@ -3532,6 +3641,568 @@
           <a:chExt cx="0" cy="0"/>
         </a:xfrm>
       </p:grpSpPr>
+      <p:pic>
+        <p:nvPicPr>
+          <p:cNvPr id="10" name="Picture 9">
+            <a:extLst>
+              <a:ext uri="{FF2B5EF4-FFF2-40B4-BE49-F238E27FC236}">
+                <a16:creationId xmlns:a16="http://schemas.microsoft.com/office/drawing/2014/main" id="{58A75465-9806-4B5C-8366-F16A06D2E23E}"/>
+              </a:ext>
+            </a:extLst>
+          </p:cNvPr>
+          <p:cNvPicPr>
+            <a:picLocks noChangeAspect="1"/>
+          </p:cNvPicPr>
+          <p:nvPr/>
+        </p:nvPicPr>
+        <p:blipFill>
+          <a:blip r:embed="rId2"/>
+          <a:stretch>
+            <a:fillRect/>
+          </a:stretch>
+        </p:blipFill>
+        <p:spPr>
+          <a:xfrm>
+            <a:off x="7287218" y="1936658"/>
+            <a:ext cx="4652856" cy="2523375"/>
+          </a:xfrm>
+          <a:prstGeom prst="rect">
+            <a:avLst/>
+          </a:prstGeom>
+        </p:spPr>
+      </p:pic>
+      <p:pic>
+        <p:nvPicPr>
+          <p:cNvPr id="19" name="Picture 18">
+            <a:extLst>
+              <a:ext uri="{FF2B5EF4-FFF2-40B4-BE49-F238E27FC236}">
+                <a16:creationId xmlns:a16="http://schemas.microsoft.com/office/drawing/2014/main" id="{107210C5-CAC3-40D4-B5FE-48610A712655}"/>
+              </a:ext>
+            </a:extLst>
+          </p:cNvPr>
+          <p:cNvPicPr>
+            <a:picLocks noChangeAspect="1"/>
+          </p:cNvPicPr>
+          <p:nvPr/>
+        </p:nvPicPr>
+        <p:blipFill>
+          <a:blip r:embed="rId3"/>
+          <a:stretch>
+            <a:fillRect/>
+          </a:stretch>
+        </p:blipFill>
+        <p:spPr>
+          <a:xfrm>
+            <a:off x="251926" y="1936658"/>
+            <a:ext cx="6459289" cy="2737321"/>
+          </a:xfrm>
+          <a:prstGeom prst="rect">
+            <a:avLst/>
+          </a:prstGeom>
+        </p:spPr>
+      </p:pic>
+      <p:sp>
+        <p:nvSpPr>
+          <p:cNvPr id="11" name="TextBox 10">
+            <a:extLst>
+              <a:ext uri="{FF2B5EF4-FFF2-40B4-BE49-F238E27FC236}">
+                <a16:creationId xmlns:a16="http://schemas.microsoft.com/office/drawing/2014/main" id="{582E15BF-2DE7-483A-8A38-1E0658A1ED71}"/>
+              </a:ext>
+            </a:extLst>
+          </p:cNvPr>
+          <p:cNvSpPr txBox="1"/>
+          <p:nvPr/>
+        </p:nvSpPr>
+        <p:spPr>
+          <a:xfrm>
+            <a:off x="3071995" y="1936658"/>
+            <a:ext cx="819150" cy="369332"/>
+          </a:xfrm>
+          <a:prstGeom prst="rect">
+            <a:avLst/>
+          </a:prstGeom>
+          <a:solidFill>
+            <a:srgbClr val="00B050"/>
+          </a:solidFill>
+          <a:ln>
+            <a:solidFill>
+              <a:srgbClr val="00B050"/>
+            </a:solidFill>
+          </a:ln>
+          <a:effectLst>
+            <a:outerShdw blurRad="50800" dist="38100" dir="2700000" algn="tl" rotWithShape="0">
+              <a:prstClr val="black">
+                <a:alpha val="40000"/>
+              </a:prstClr>
+            </a:outerShdw>
+          </a:effectLst>
+        </p:spPr>
+        <p:txBody>
+          <a:bodyPr wrap="square" rtlCol="0">
+            <a:spAutoFit/>
+          </a:bodyPr>
+          <a:lstStyle/>
+          <a:p>
+            <a:pPr algn="ctr"/>
+            <a:r>
+              <a:rPr lang="en-US" b="1" dirty="0">
+                <a:solidFill>
+                  <a:schemeClr val="bg1"/>
+                </a:solidFill>
+              </a:rPr>
+              <a:t>EOSIO</a:t>
+            </a:r>
+          </a:p>
+        </p:txBody>
+      </p:sp>
+      <p:sp>
+        <p:nvSpPr>
+          <p:cNvPr id="12" name="TextBox 11">
+            <a:extLst>
+              <a:ext uri="{FF2B5EF4-FFF2-40B4-BE49-F238E27FC236}">
+                <a16:creationId xmlns:a16="http://schemas.microsoft.com/office/drawing/2014/main" id="{5E26C181-E710-4A62-A739-A330C69C3CAA}"/>
+              </a:ext>
+            </a:extLst>
+          </p:cNvPr>
+          <p:cNvSpPr txBox="1"/>
+          <p:nvPr/>
+        </p:nvSpPr>
+        <p:spPr>
+          <a:xfrm>
+            <a:off x="9472804" y="1936658"/>
+            <a:ext cx="819150" cy="369332"/>
+          </a:xfrm>
+          <a:prstGeom prst="rect">
+            <a:avLst/>
+          </a:prstGeom>
+          <a:solidFill>
+            <a:srgbClr val="00B0F0"/>
+          </a:solidFill>
+          <a:ln>
+            <a:solidFill>
+              <a:srgbClr val="00B0F0"/>
+            </a:solidFill>
+          </a:ln>
+          <a:effectLst>
+            <a:outerShdw blurRad="50800" dist="38100" dir="2700000" algn="tl" rotWithShape="0">
+              <a:prstClr val="black">
+                <a:alpha val="40000"/>
+              </a:prstClr>
+            </a:outerShdw>
+          </a:effectLst>
+        </p:spPr>
+        <p:txBody>
+          <a:bodyPr wrap="square" rtlCol="0">
+            <a:spAutoFit/>
+          </a:bodyPr>
+          <a:lstStyle/>
+          <a:p>
+            <a:pPr algn="ctr"/>
+            <a:r>
+              <a:rPr lang="en-US" dirty="0">
+                <a:solidFill>
+                  <a:schemeClr val="bg1"/>
+                </a:solidFill>
+              </a:rPr>
+              <a:t>ETH</a:t>
+            </a:r>
+          </a:p>
+        </p:txBody>
+      </p:sp>
+    </p:spTree>
+    <p:extLst>
+      <p:ext uri="{BB962C8B-B14F-4D97-AF65-F5344CB8AC3E}">
+        <p14:creationId xmlns:p14="http://schemas.microsoft.com/office/powerpoint/2010/main" val="2733668004"/>
+      </p:ext>
+    </p:extLst>
+  </p:cSld>
+  <p:clrMapOvr>
+    <a:masterClrMapping/>
+  </p:clrMapOvr>
+</p:sld>
+</file>
+
+<file path=ppt/slides/slide3.xml><?xml version="1.0" encoding="utf-8"?>
+<p:sld xmlns:a="http://schemas.openxmlformats.org/drawingml/2006/main" xmlns:r="http://schemas.openxmlformats.org/officeDocument/2006/relationships" xmlns:p="http://schemas.openxmlformats.org/presentationml/2006/main">
+  <p:cSld>
+    <p:spTree>
+      <p:nvGrpSpPr>
+        <p:cNvPr id="1" name=""/>
+        <p:cNvGrpSpPr/>
+        <p:nvPr/>
+      </p:nvGrpSpPr>
+      <p:grpSpPr>
+        <a:xfrm>
+          <a:off x="0" y="0"/>
+          <a:ext cx="0" cy="0"/>
+          <a:chOff x="0" y="0"/>
+          <a:chExt cx="0" cy="0"/>
+        </a:xfrm>
+      </p:grpSpPr>
+      <p:pic>
+        <p:nvPicPr>
+          <p:cNvPr id="3" name="Picture 2">
+            <a:extLst>
+              <a:ext uri="{FF2B5EF4-FFF2-40B4-BE49-F238E27FC236}">
+                <a16:creationId xmlns:a16="http://schemas.microsoft.com/office/drawing/2014/main" id="{AB768F90-2086-4F89-8C2F-95D5113FB004}"/>
+              </a:ext>
+            </a:extLst>
+          </p:cNvPr>
+          <p:cNvPicPr>
+            <a:picLocks noChangeAspect="1"/>
+          </p:cNvPicPr>
+          <p:nvPr/>
+        </p:nvPicPr>
+        <p:blipFill>
+          <a:blip r:embed="rId2"/>
+          <a:stretch>
+            <a:fillRect/>
+          </a:stretch>
+        </p:blipFill>
+        <p:spPr>
+          <a:xfrm>
+            <a:off x="386037" y="1936073"/>
+            <a:ext cx="5619565" cy="2985853"/>
+          </a:xfrm>
+          <a:prstGeom prst="rect">
+            <a:avLst/>
+          </a:prstGeom>
+        </p:spPr>
+      </p:pic>
+      <p:pic>
+        <p:nvPicPr>
+          <p:cNvPr id="17" name="Picture 16">
+            <a:extLst>
+              <a:ext uri="{FF2B5EF4-FFF2-40B4-BE49-F238E27FC236}">
+                <a16:creationId xmlns:a16="http://schemas.microsoft.com/office/drawing/2014/main" id="{C03DAC26-4B1D-4FF1-8563-596E1DAB833C}"/>
+              </a:ext>
+            </a:extLst>
+          </p:cNvPr>
+          <p:cNvPicPr>
+            <a:picLocks noChangeAspect="1"/>
+          </p:cNvPicPr>
+          <p:nvPr/>
+        </p:nvPicPr>
+        <p:blipFill>
+          <a:blip r:embed="rId3"/>
+          <a:stretch>
+            <a:fillRect/>
+          </a:stretch>
+        </p:blipFill>
+        <p:spPr>
+          <a:xfrm>
+            <a:off x="6636871" y="1936073"/>
+            <a:ext cx="5340276" cy="2775886"/>
+          </a:xfrm>
+          <a:prstGeom prst="rect">
+            <a:avLst/>
+          </a:prstGeom>
+        </p:spPr>
+      </p:pic>
+      <p:sp>
+        <p:nvSpPr>
+          <p:cNvPr id="11" name="TextBox 10">
+            <a:extLst>
+              <a:ext uri="{FF2B5EF4-FFF2-40B4-BE49-F238E27FC236}">
+                <a16:creationId xmlns:a16="http://schemas.microsoft.com/office/drawing/2014/main" id="{582E15BF-2DE7-483A-8A38-1E0658A1ED71}"/>
+              </a:ext>
+            </a:extLst>
+          </p:cNvPr>
+          <p:cNvSpPr txBox="1"/>
+          <p:nvPr/>
+        </p:nvSpPr>
+        <p:spPr>
+          <a:xfrm>
+            <a:off x="2786245" y="1936658"/>
+            <a:ext cx="819150" cy="369332"/>
+          </a:xfrm>
+          <a:prstGeom prst="rect">
+            <a:avLst/>
+          </a:prstGeom>
+          <a:solidFill>
+            <a:srgbClr val="00B050"/>
+          </a:solidFill>
+          <a:ln>
+            <a:solidFill>
+              <a:srgbClr val="00B050"/>
+            </a:solidFill>
+          </a:ln>
+          <a:effectLst>
+            <a:outerShdw blurRad="50800" dist="38100" dir="2700000" algn="tl" rotWithShape="0">
+              <a:prstClr val="black">
+                <a:alpha val="40000"/>
+              </a:prstClr>
+            </a:outerShdw>
+          </a:effectLst>
+        </p:spPr>
+        <p:txBody>
+          <a:bodyPr wrap="square" rtlCol="0">
+            <a:spAutoFit/>
+          </a:bodyPr>
+          <a:lstStyle/>
+          <a:p>
+            <a:pPr algn="ctr"/>
+            <a:r>
+              <a:rPr lang="en-US" b="1" dirty="0">
+                <a:solidFill>
+                  <a:schemeClr val="bg1"/>
+                </a:solidFill>
+              </a:rPr>
+              <a:t>EOSIO</a:t>
+            </a:r>
+          </a:p>
+        </p:txBody>
+      </p:sp>
+      <p:sp>
+        <p:nvSpPr>
+          <p:cNvPr id="12" name="TextBox 11">
+            <a:extLst>
+              <a:ext uri="{FF2B5EF4-FFF2-40B4-BE49-F238E27FC236}">
+                <a16:creationId xmlns:a16="http://schemas.microsoft.com/office/drawing/2014/main" id="{5E26C181-E710-4A62-A739-A330C69C3CAA}"/>
+              </a:ext>
+            </a:extLst>
+          </p:cNvPr>
+          <p:cNvSpPr txBox="1"/>
+          <p:nvPr/>
+        </p:nvSpPr>
+        <p:spPr>
+          <a:xfrm>
+            <a:off x="8777478" y="1936658"/>
+            <a:ext cx="819150" cy="369332"/>
+          </a:xfrm>
+          <a:prstGeom prst="rect">
+            <a:avLst/>
+          </a:prstGeom>
+          <a:solidFill>
+            <a:srgbClr val="00B0F0"/>
+          </a:solidFill>
+          <a:ln>
+            <a:solidFill>
+              <a:srgbClr val="00B0F0"/>
+            </a:solidFill>
+          </a:ln>
+          <a:effectLst>
+            <a:outerShdw blurRad="50800" dist="38100" dir="2700000" algn="tl" rotWithShape="0">
+              <a:prstClr val="black">
+                <a:alpha val="40000"/>
+              </a:prstClr>
+            </a:outerShdw>
+          </a:effectLst>
+        </p:spPr>
+        <p:txBody>
+          <a:bodyPr wrap="square" rtlCol="0">
+            <a:spAutoFit/>
+          </a:bodyPr>
+          <a:lstStyle/>
+          <a:p>
+            <a:pPr algn="ctr"/>
+            <a:r>
+              <a:rPr lang="en-US" dirty="0">
+                <a:solidFill>
+                  <a:schemeClr val="bg1"/>
+                </a:solidFill>
+              </a:rPr>
+              <a:t>ETH</a:t>
+            </a:r>
+          </a:p>
+        </p:txBody>
+      </p:sp>
+      <p:sp>
+        <p:nvSpPr>
+          <p:cNvPr id="6" name="TextBox 5">
+            <a:extLst>
+              <a:ext uri="{FF2B5EF4-FFF2-40B4-BE49-F238E27FC236}">
+                <a16:creationId xmlns:a16="http://schemas.microsoft.com/office/drawing/2014/main" id="{A7A54DB9-326F-405B-B4BD-34C198975A70}"/>
+              </a:ext>
+            </a:extLst>
+          </p:cNvPr>
+          <p:cNvSpPr txBox="1"/>
+          <p:nvPr/>
+        </p:nvSpPr>
+        <p:spPr>
+          <a:xfrm>
+            <a:off x="1003259" y="828675"/>
+            <a:ext cx="5092741" cy="369332"/>
+          </a:xfrm>
+          <a:prstGeom prst="rect">
+            <a:avLst/>
+          </a:prstGeom>
+        </p:spPr>
+        <p:style>
+          <a:lnRef idx="2">
+            <a:schemeClr val="accent5"/>
+          </a:lnRef>
+          <a:fillRef idx="1">
+            <a:schemeClr val="lt1"/>
+          </a:fillRef>
+          <a:effectRef idx="0">
+            <a:schemeClr val="accent5"/>
+          </a:effectRef>
+          <a:fontRef idx="minor">
+            <a:schemeClr val="dk1"/>
+          </a:fontRef>
+        </p:style>
+        <p:txBody>
+          <a:bodyPr wrap="none" rtlCol="0">
+            <a:spAutoFit/>
+          </a:bodyPr>
+          <a:lstStyle/>
+          <a:p>
+            <a:r>
+              <a:rPr lang="en-US" dirty="0"/>
+              <a:t>EOSIO Blockchain account name must be of 12 chars</a:t>
+            </a:r>
+          </a:p>
+        </p:txBody>
+      </p:sp>
+      <p:cxnSp>
+        <p:nvCxnSpPr>
+          <p:cNvPr id="8" name="Straight Connector 7">
+            <a:extLst>
+              <a:ext uri="{FF2B5EF4-FFF2-40B4-BE49-F238E27FC236}">
+                <a16:creationId xmlns:a16="http://schemas.microsoft.com/office/drawing/2014/main" id="{29BEF7EB-E086-42D1-9E6F-E0132BB5BF61}"/>
+              </a:ext>
+            </a:extLst>
+          </p:cNvPr>
+          <p:cNvCxnSpPr>
+            <a:cxnSpLocks/>
+          </p:cNvCxnSpPr>
+          <p:nvPr/>
+        </p:nvCxnSpPr>
+        <p:spPr>
+          <a:xfrm flipV="1">
+            <a:off x="1859700" y="1198007"/>
+            <a:ext cx="1336119" cy="1491613"/>
+          </a:xfrm>
+          <a:prstGeom prst="line">
+            <a:avLst/>
+          </a:prstGeom>
+        </p:spPr>
+        <p:style>
+          <a:lnRef idx="3">
+            <a:schemeClr val="accent4"/>
+          </a:lnRef>
+          <a:fillRef idx="0">
+            <a:schemeClr val="accent4"/>
+          </a:fillRef>
+          <a:effectRef idx="2">
+            <a:schemeClr val="accent4"/>
+          </a:effectRef>
+          <a:fontRef idx="minor">
+            <a:schemeClr val="tx1"/>
+          </a:fontRef>
+        </p:style>
+      </p:cxnSp>
+      <p:sp>
+        <p:nvSpPr>
+          <p:cNvPr id="13" name="TextBox 12">
+            <a:extLst>
+              <a:ext uri="{FF2B5EF4-FFF2-40B4-BE49-F238E27FC236}">
+                <a16:creationId xmlns:a16="http://schemas.microsoft.com/office/drawing/2014/main" id="{9333B3EB-6845-47E0-9376-3C6454F4CB35}"/>
+              </a:ext>
+            </a:extLst>
+          </p:cNvPr>
+          <p:cNvSpPr txBox="1"/>
+          <p:nvPr/>
+        </p:nvSpPr>
+        <p:spPr>
+          <a:xfrm>
+            <a:off x="386037" y="1566741"/>
+            <a:ext cx="1952626" cy="369332"/>
+          </a:xfrm>
+          <a:prstGeom prst="rect">
+            <a:avLst/>
+          </a:prstGeom>
+          <a:solidFill>
+            <a:schemeClr val="bg1">
+              <a:lumMod val="75000"/>
+            </a:schemeClr>
+          </a:solidFill>
+        </p:spPr>
+        <p:txBody>
+          <a:bodyPr wrap="square" rtlCol="0">
+            <a:spAutoFit/>
+          </a:bodyPr>
+          <a:lstStyle/>
+          <a:p>
+            <a:pPr algn="ctr"/>
+            <a:r>
+              <a:rPr lang="en-US" dirty="0"/>
+              <a:t>car111111111.cpp</a:t>
+            </a:r>
+          </a:p>
+        </p:txBody>
+      </p:sp>
+      <p:sp>
+        <p:nvSpPr>
+          <p:cNvPr id="16" name="TextBox 15">
+            <a:extLst>
+              <a:ext uri="{FF2B5EF4-FFF2-40B4-BE49-F238E27FC236}">
+                <a16:creationId xmlns:a16="http://schemas.microsoft.com/office/drawing/2014/main" id="{2A157FD5-2C8B-41E8-8D5B-8A3087CDB249}"/>
+              </a:ext>
+            </a:extLst>
+          </p:cNvPr>
+          <p:cNvSpPr txBox="1"/>
+          <p:nvPr/>
+        </p:nvSpPr>
+        <p:spPr>
+          <a:xfrm>
+            <a:off x="6636871" y="1566741"/>
+            <a:ext cx="983129" cy="369332"/>
+          </a:xfrm>
+          <a:prstGeom prst="rect">
+            <a:avLst/>
+          </a:prstGeom>
+          <a:solidFill>
+            <a:schemeClr val="bg1">
+              <a:lumMod val="75000"/>
+            </a:schemeClr>
+          </a:solidFill>
+        </p:spPr>
+        <p:txBody>
+          <a:bodyPr wrap="square" rtlCol="0">
+            <a:spAutoFit/>
+          </a:bodyPr>
+          <a:lstStyle/>
+          <a:p>
+            <a:pPr algn="ctr"/>
+            <a:r>
+              <a:rPr lang="en-US" dirty="0"/>
+              <a:t>Car.sol</a:t>
+            </a:r>
+          </a:p>
+        </p:txBody>
+      </p:sp>
+    </p:spTree>
+    <p:extLst>
+      <p:ext uri="{BB962C8B-B14F-4D97-AF65-F5344CB8AC3E}">
+        <p14:creationId xmlns:p14="http://schemas.microsoft.com/office/powerpoint/2010/main" val="2829698683"/>
+      </p:ext>
+    </p:extLst>
+  </p:cSld>
+  <p:clrMapOvr>
+    <a:masterClrMapping/>
+  </p:clrMapOvr>
+</p:sld>
+</file>
+
+<file path=ppt/slides/slide4.xml><?xml version="1.0" encoding="utf-8"?>
+<p:sld xmlns:a="http://schemas.openxmlformats.org/drawingml/2006/main" xmlns:r="http://schemas.openxmlformats.org/officeDocument/2006/relationships" xmlns:p="http://schemas.openxmlformats.org/presentationml/2006/main">
+  <p:cSld>
+    <p:spTree>
+      <p:nvGrpSpPr>
+        <p:cNvPr id="1" name=""/>
+        <p:cNvGrpSpPr/>
+        <p:nvPr/>
+      </p:nvGrpSpPr>
+      <p:grpSpPr>
+        <a:xfrm>
+          <a:off x="0" y="0"/>
+          <a:ext cx="0" cy="0"/>
+          <a:chOff x="0" y="0"/>
+          <a:chExt cx="0" cy="0"/>
+        </a:xfrm>
+      </p:grpSpPr>
       <p:sp>
         <p:nvSpPr>
           <p:cNvPr id="3" name="Content Placeholder 2">
@@ -3769,6 +4440,20 @@
                 <a:latin typeface="-apple-system"/>
               </a:rPr>
               <a:t>#bitcoin</a:t>
+            </a:r>
+            <a:r>
+              <a:rPr lang="en-US" b="0" i="0" dirty="0">
+                <a:effectLst/>
+                <a:latin typeface="-apple-system"/>
+              </a:rPr>
+              <a:t> </a:t>
+            </a:r>
+            <a:r>
+              <a:rPr lang="en-US" b="1" i="0" dirty="0">
+                <a:effectLst/>
+                <a:latin typeface="-apple-system"/>
+              </a:rPr>
+              <a:t>#medium</a:t>
             </a:r>
             <a:endParaRPr lang="en-US" dirty="0"/>
           </a:p>

</xml_diff>